<commit_message>
finish lecture 3 (or 4)
</commit_message>
<xml_diff>
--- a/src/03-BuildingBlocks/03-BuildingBlocks.pptx
+++ b/src/03-BuildingBlocks/03-BuildingBlocks.pptx
@@ -5,7 +5,7 @@
     <p:sldMasterId id="2147483648" r:id="rId1"/>
   </p:sldMasterIdLst>
   <p:notesMasterIdLst>
-    <p:notesMasterId r:id="rId49"/>
+    <p:notesMasterId r:id="rId50"/>
   </p:notesMasterIdLst>
   <p:sldIdLst>
     <p:sldId id="256" r:id="rId2"/>
@@ -55,6 +55,7 @@
     <p:sldId id="360" r:id="rId46"/>
     <p:sldId id="361" r:id="rId47"/>
     <p:sldId id="258" r:id="rId48"/>
+    <p:sldId id="365" r:id="rId49"/>
   </p:sldIdLst>
   <p:sldSz cx="12192000" cy="6858000"/>
   <p:notesSz cx="6858000" cy="9144000"/>
@@ -213,6 +214,7 @@
         <p14:section name="Conclusion" id="{FAAC3CD8-4D89-4EEB-BC6E-FC3060975D43}">
           <p14:sldIdLst>
             <p14:sldId id="258"/>
+            <p14:sldId id="365"/>
           </p14:sldIdLst>
         </p14:section>
       </p14:sectionLst>
@@ -23984,8 +23986,8 @@
           </a:p>
         </p:txBody>
       </p:sp>
-      <mc:AlternateContent xmlns:mc="http://schemas.openxmlformats.org/markup-compatibility/2006">
-        <mc:Choice xmlns:p14="http://schemas.microsoft.com/office/powerpoint/2010/main" Requires="p14">
+      <mc:AlternateContent xmlns:mc="http://schemas.openxmlformats.org/markup-compatibility/2006" xmlns:p14="http://schemas.microsoft.com/office/powerpoint/2010/main">
+        <mc:Choice Requires="p14">
           <p:contentPart p14:bwMode="auto" r:id="rId2">
             <p14:nvContentPartPr>
               <p14:cNvPr id="5" name="Ink 4">
@@ -24004,7 +24006,7 @@
             </p14:xfrm>
           </p:contentPart>
         </mc:Choice>
-        <mc:Fallback>
+        <mc:Fallback xmlns="">
           <p:pic>
             <p:nvPicPr>
               <p:cNvPr id="5" name="Ink 4">
@@ -24035,8 +24037,8 @@
           </p:pic>
         </mc:Fallback>
       </mc:AlternateContent>
-      <mc:AlternateContent xmlns:mc="http://schemas.openxmlformats.org/markup-compatibility/2006">
-        <mc:Choice xmlns:p14="http://schemas.microsoft.com/office/powerpoint/2010/main" Requires="p14">
+      <mc:AlternateContent xmlns:mc="http://schemas.openxmlformats.org/markup-compatibility/2006" xmlns:p14="http://schemas.microsoft.com/office/powerpoint/2010/main">
+        <mc:Choice Requires="p14">
           <p:contentPart p14:bwMode="auto" r:id="rId4">
             <p14:nvContentPartPr>
               <p14:cNvPr id="6" name="Ink 5">
@@ -24055,7 +24057,7 @@
             </p14:xfrm>
           </p:contentPart>
         </mc:Choice>
-        <mc:Fallback>
+        <mc:Fallback xmlns="">
           <p:pic>
             <p:nvPicPr>
               <p:cNvPr id="6" name="Ink 5">
@@ -24086,8 +24088,8 @@
           </p:pic>
         </mc:Fallback>
       </mc:AlternateContent>
-      <mc:AlternateContent xmlns:mc="http://schemas.openxmlformats.org/markup-compatibility/2006">
-        <mc:Choice xmlns:p14="http://schemas.microsoft.com/office/powerpoint/2010/main" Requires="p14">
+      <mc:AlternateContent xmlns:mc="http://schemas.openxmlformats.org/markup-compatibility/2006" xmlns:p14="http://schemas.microsoft.com/office/powerpoint/2010/main">
+        <mc:Choice Requires="p14">
           <p:contentPart p14:bwMode="auto" r:id="rId6">
             <p14:nvContentPartPr>
               <p14:cNvPr id="7" name="Ink 6">
@@ -24106,7 +24108,7 @@
             </p14:xfrm>
           </p:contentPart>
         </mc:Choice>
-        <mc:Fallback>
+        <mc:Fallback xmlns="">
           <p:pic>
             <p:nvPicPr>
               <p:cNvPr id="7" name="Ink 6">
@@ -24137,8 +24139,8 @@
           </p:pic>
         </mc:Fallback>
       </mc:AlternateContent>
-      <mc:AlternateContent xmlns:mc="http://schemas.openxmlformats.org/markup-compatibility/2006">
-        <mc:Choice xmlns:p14="http://schemas.microsoft.com/office/powerpoint/2010/main" Requires="p14">
+      <mc:AlternateContent xmlns:mc="http://schemas.openxmlformats.org/markup-compatibility/2006" xmlns:p14="http://schemas.microsoft.com/office/powerpoint/2010/main">
+        <mc:Choice Requires="p14">
           <p:contentPart p14:bwMode="auto" r:id="rId8">
             <p14:nvContentPartPr>
               <p14:cNvPr id="8" name="Ink 7">
@@ -24157,7 +24159,7 @@
             </p14:xfrm>
           </p:contentPart>
         </mc:Choice>
-        <mc:Fallback>
+        <mc:Fallback xmlns="">
           <p:pic>
             <p:nvPicPr>
               <p:cNvPr id="8" name="Ink 7">
@@ -24188,8 +24190,8 @@
           </p:pic>
         </mc:Fallback>
       </mc:AlternateContent>
-      <mc:AlternateContent xmlns:mc="http://schemas.openxmlformats.org/markup-compatibility/2006">
-        <mc:Choice xmlns:p14="http://schemas.microsoft.com/office/powerpoint/2010/main" Requires="p14">
+      <mc:AlternateContent xmlns:mc="http://schemas.openxmlformats.org/markup-compatibility/2006" xmlns:p14="http://schemas.microsoft.com/office/powerpoint/2010/main">
+        <mc:Choice Requires="p14">
           <p:contentPart p14:bwMode="auto" r:id="rId10">
             <p14:nvContentPartPr>
               <p14:cNvPr id="9" name="Ink 8">
@@ -24208,7 +24210,7 @@
             </p14:xfrm>
           </p:contentPart>
         </mc:Choice>
-        <mc:Fallback>
+        <mc:Fallback xmlns="">
           <p:pic>
             <p:nvPicPr>
               <p:cNvPr id="9" name="Ink 8">
@@ -24259,8 +24261,8 @@
             <a:chExt cx="2349720" cy="2633400"/>
           </a:xfrm>
         </p:grpSpPr>
-        <mc:AlternateContent xmlns:mc="http://schemas.openxmlformats.org/markup-compatibility/2006">
-          <mc:Choice xmlns:p14="http://schemas.microsoft.com/office/powerpoint/2010/main" Requires="p14">
+        <mc:AlternateContent xmlns:mc="http://schemas.openxmlformats.org/markup-compatibility/2006" xmlns:p14="http://schemas.microsoft.com/office/powerpoint/2010/main">
+          <mc:Choice Requires="p14">
             <p:contentPart p14:bwMode="auto" r:id="rId12">
               <p14:nvContentPartPr>
                 <p14:cNvPr id="11" name="Ink 10">
@@ -24279,7 +24281,7 @@
               </p14:xfrm>
             </p:contentPart>
           </mc:Choice>
-          <mc:Fallback>
+          <mc:Fallback xmlns="">
             <p:pic>
               <p:nvPicPr>
                 <p:cNvPr id="11" name="Ink 10">
@@ -24310,8 +24312,8 @@
             </p:pic>
           </mc:Fallback>
         </mc:AlternateContent>
-        <mc:AlternateContent xmlns:mc="http://schemas.openxmlformats.org/markup-compatibility/2006">
-          <mc:Choice xmlns:p14="http://schemas.microsoft.com/office/powerpoint/2010/main" Requires="p14">
+        <mc:AlternateContent xmlns:mc="http://schemas.openxmlformats.org/markup-compatibility/2006" xmlns:p14="http://schemas.microsoft.com/office/powerpoint/2010/main">
+          <mc:Choice Requires="p14">
             <p:contentPart p14:bwMode="auto" r:id="rId14">
               <p14:nvContentPartPr>
                 <p14:cNvPr id="12" name="Ink 11">
@@ -24330,7 +24332,7 @@
               </p14:xfrm>
             </p:contentPart>
           </mc:Choice>
-          <mc:Fallback>
+          <mc:Fallback xmlns="">
             <p:pic>
               <p:nvPicPr>
                 <p:cNvPr id="12" name="Ink 11">
@@ -24361,8 +24363,8 @@
             </p:pic>
           </mc:Fallback>
         </mc:AlternateContent>
-        <mc:AlternateContent xmlns:mc="http://schemas.openxmlformats.org/markup-compatibility/2006">
-          <mc:Choice xmlns:p14="http://schemas.microsoft.com/office/powerpoint/2010/main" Requires="p14">
+        <mc:AlternateContent xmlns:mc="http://schemas.openxmlformats.org/markup-compatibility/2006" xmlns:p14="http://schemas.microsoft.com/office/powerpoint/2010/main">
+          <mc:Choice Requires="p14">
             <p:contentPart p14:bwMode="auto" r:id="rId16">
               <p14:nvContentPartPr>
                 <p14:cNvPr id="13" name="Ink 12">
@@ -24381,7 +24383,7 @@
               </p14:xfrm>
             </p:contentPart>
           </mc:Choice>
-          <mc:Fallback>
+          <mc:Fallback xmlns="">
             <p:pic>
               <p:nvPicPr>
                 <p:cNvPr id="13" name="Ink 12">
@@ -24412,8 +24414,8 @@
             </p:pic>
           </mc:Fallback>
         </mc:AlternateContent>
-        <mc:AlternateContent xmlns:mc="http://schemas.openxmlformats.org/markup-compatibility/2006">
-          <mc:Choice xmlns:p14="http://schemas.microsoft.com/office/powerpoint/2010/main" Requires="p14">
+        <mc:AlternateContent xmlns:mc="http://schemas.openxmlformats.org/markup-compatibility/2006" xmlns:p14="http://schemas.microsoft.com/office/powerpoint/2010/main">
+          <mc:Choice Requires="p14">
             <p:contentPart p14:bwMode="auto" r:id="rId18">
               <p14:nvContentPartPr>
                 <p14:cNvPr id="15" name="Ink 14">
@@ -24432,7 +24434,7 @@
               </p14:xfrm>
             </p:contentPart>
           </mc:Choice>
-          <mc:Fallback>
+          <mc:Fallback xmlns="">
             <p:pic>
               <p:nvPicPr>
                 <p:cNvPr id="15" name="Ink 14">
@@ -24463,8 +24465,8 @@
             </p:pic>
           </mc:Fallback>
         </mc:AlternateContent>
-        <mc:AlternateContent xmlns:mc="http://schemas.openxmlformats.org/markup-compatibility/2006">
-          <mc:Choice xmlns:p14="http://schemas.microsoft.com/office/powerpoint/2010/main" Requires="p14">
+        <mc:AlternateContent xmlns:mc="http://schemas.openxmlformats.org/markup-compatibility/2006" xmlns:p14="http://schemas.microsoft.com/office/powerpoint/2010/main">
+          <mc:Choice Requires="p14">
             <p:contentPart p14:bwMode="auto" r:id="rId20">
               <p14:nvContentPartPr>
                 <p14:cNvPr id="16" name="Ink 15">
@@ -24483,7 +24485,7 @@
               </p14:xfrm>
             </p:contentPart>
           </mc:Choice>
-          <mc:Fallback>
+          <mc:Fallback xmlns="">
             <p:pic>
               <p:nvPicPr>
                 <p:cNvPr id="16" name="Ink 15">
@@ -24514,8 +24516,8 @@
             </p:pic>
           </mc:Fallback>
         </mc:AlternateContent>
-        <mc:AlternateContent xmlns:mc="http://schemas.openxmlformats.org/markup-compatibility/2006">
-          <mc:Choice xmlns:p14="http://schemas.microsoft.com/office/powerpoint/2010/main" Requires="p14">
+        <mc:AlternateContent xmlns:mc="http://schemas.openxmlformats.org/markup-compatibility/2006" xmlns:p14="http://schemas.microsoft.com/office/powerpoint/2010/main">
+          <mc:Choice Requires="p14">
             <p:contentPart p14:bwMode="auto" r:id="rId22">
               <p14:nvContentPartPr>
                 <p14:cNvPr id="17" name="Ink 16">
@@ -24534,7 +24536,7 @@
               </p14:xfrm>
             </p:contentPart>
           </mc:Choice>
-          <mc:Fallback>
+          <mc:Fallback xmlns="">
             <p:pic>
               <p:nvPicPr>
                 <p:cNvPr id="17" name="Ink 16">
@@ -24565,8 +24567,8 @@
             </p:pic>
           </mc:Fallback>
         </mc:AlternateContent>
-        <mc:AlternateContent xmlns:mc="http://schemas.openxmlformats.org/markup-compatibility/2006">
-          <mc:Choice xmlns:p14="http://schemas.microsoft.com/office/powerpoint/2010/main" Requires="p14">
+        <mc:AlternateContent xmlns:mc="http://schemas.openxmlformats.org/markup-compatibility/2006" xmlns:p14="http://schemas.microsoft.com/office/powerpoint/2010/main">
+          <mc:Choice Requires="p14">
             <p:contentPart p14:bwMode="auto" r:id="rId24">
               <p14:nvContentPartPr>
                 <p14:cNvPr id="18" name="Ink 17">
@@ -24585,7 +24587,7 @@
               </p14:xfrm>
             </p:contentPart>
           </mc:Choice>
-          <mc:Fallback>
+          <mc:Fallback xmlns="">
             <p:pic>
               <p:nvPicPr>
                 <p:cNvPr id="18" name="Ink 17">
@@ -24616,8 +24618,8 @@
             </p:pic>
           </mc:Fallback>
         </mc:AlternateContent>
-        <mc:AlternateContent xmlns:mc="http://schemas.openxmlformats.org/markup-compatibility/2006">
-          <mc:Choice xmlns:p14="http://schemas.microsoft.com/office/powerpoint/2010/main" Requires="p14">
+        <mc:AlternateContent xmlns:mc="http://schemas.openxmlformats.org/markup-compatibility/2006" xmlns:p14="http://schemas.microsoft.com/office/powerpoint/2010/main">
+          <mc:Choice Requires="p14">
             <p:contentPart p14:bwMode="auto" r:id="rId26">
               <p14:nvContentPartPr>
                 <p14:cNvPr id="19" name="Ink 18">
@@ -24636,7 +24638,7 @@
               </p14:xfrm>
             </p:contentPart>
           </mc:Choice>
-          <mc:Fallback>
+          <mc:Fallback xmlns="">
             <p:pic>
               <p:nvPicPr>
                 <p:cNvPr id="19" name="Ink 18">
@@ -24667,8 +24669,8 @@
             </p:pic>
           </mc:Fallback>
         </mc:AlternateContent>
-        <mc:AlternateContent xmlns:mc="http://schemas.openxmlformats.org/markup-compatibility/2006">
-          <mc:Choice xmlns:p14="http://schemas.microsoft.com/office/powerpoint/2010/main" Requires="p14">
+        <mc:AlternateContent xmlns:mc="http://schemas.openxmlformats.org/markup-compatibility/2006" xmlns:p14="http://schemas.microsoft.com/office/powerpoint/2010/main">
+          <mc:Choice Requires="p14">
             <p:contentPart p14:bwMode="auto" r:id="rId28">
               <p14:nvContentPartPr>
                 <p14:cNvPr id="20" name="Ink 19">
@@ -24687,7 +24689,7 @@
               </p14:xfrm>
             </p:contentPart>
           </mc:Choice>
-          <mc:Fallback>
+          <mc:Fallback xmlns="">
             <p:pic>
               <p:nvPicPr>
                 <p:cNvPr id="20" name="Ink 19">
@@ -24718,8 +24720,8 @@
             </p:pic>
           </mc:Fallback>
         </mc:AlternateContent>
-        <mc:AlternateContent xmlns:mc="http://schemas.openxmlformats.org/markup-compatibility/2006">
-          <mc:Choice xmlns:p14="http://schemas.microsoft.com/office/powerpoint/2010/main" Requires="p14">
+        <mc:AlternateContent xmlns:mc="http://schemas.openxmlformats.org/markup-compatibility/2006" xmlns:p14="http://schemas.microsoft.com/office/powerpoint/2010/main">
+          <mc:Choice Requires="p14">
             <p:contentPart p14:bwMode="auto" r:id="rId30">
               <p14:nvContentPartPr>
                 <p14:cNvPr id="21" name="Ink 20">
@@ -24738,7 +24740,7 @@
               </p14:xfrm>
             </p:contentPart>
           </mc:Choice>
-          <mc:Fallback>
+          <mc:Fallback xmlns="">
             <p:pic>
               <p:nvPicPr>
                 <p:cNvPr id="21" name="Ink 20">
@@ -24769,8 +24771,8 @@
             </p:pic>
           </mc:Fallback>
         </mc:AlternateContent>
-        <mc:AlternateContent xmlns:mc="http://schemas.openxmlformats.org/markup-compatibility/2006">
-          <mc:Choice xmlns:p14="http://schemas.microsoft.com/office/powerpoint/2010/main" Requires="p14">
+        <mc:AlternateContent xmlns:mc="http://schemas.openxmlformats.org/markup-compatibility/2006" xmlns:p14="http://schemas.microsoft.com/office/powerpoint/2010/main">
+          <mc:Choice Requires="p14">
             <p:contentPart p14:bwMode="auto" r:id="rId32">
               <p14:nvContentPartPr>
                 <p14:cNvPr id="22" name="Ink 21">
@@ -24789,7 +24791,7 @@
               </p14:xfrm>
             </p:contentPart>
           </mc:Choice>
-          <mc:Fallback>
+          <mc:Fallback xmlns="">
             <p:pic>
               <p:nvPicPr>
                 <p:cNvPr id="22" name="Ink 21">
@@ -24820,8 +24822,8 @@
             </p:pic>
           </mc:Fallback>
         </mc:AlternateContent>
-        <mc:AlternateContent xmlns:mc="http://schemas.openxmlformats.org/markup-compatibility/2006">
-          <mc:Choice xmlns:p14="http://schemas.microsoft.com/office/powerpoint/2010/main" Requires="p14">
+        <mc:AlternateContent xmlns:mc="http://schemas.openxmlformats.org/markup-compatibility/2006" xmlns:p14="http://schemas.microsoft.com/office/powerpoint/2010/main">
+          <mc:Choice Requires="p14">
             <p:contentPart p14:bwMode="auto" r:id="rId34">
               <p14:nvContentPartPr>
                 <p14:cNvPr id="23" name="Ink 22">
@@ -24840,7 +24842,7 @@
               </p14:xfrm>
             </p:contentPart>
           </mc:Choice>
-          <mc:Fallback>
+          <mc:Fallback xmlns="">
             <p:pic>
               <p:nvPicPr>
                 <p:cNvPr id="23" name="Ink 22">
@@ -24871,8 +24873,8 @@
             </p:pic>
           </mc:Fallback>
         </mc:AlternateContent>
-        <mc:AlternateContent xmlns:mc="http://schemas.openxmlformats.org/markup-compatibility/2006">
-          <mc:Choice xmlns:p14="http://schemas.microsoft.com/office/powerpoint/2010/main" Requires="p14">
+        <mc:AlternateContent xmlns:mc="http://schemas.openxmlformats.org/markup-compatibility/2006" xmlns:p14="http://schemas.microsoft.com/office/powerpoint/2010/main">
+          <mc:Choice Requires="p14">
             <p:contentPart p14:bwMode="auto" r:id="rId36">
               <p14:nvContentPartPr>
                 <p14:cNvPr id="24" name="Ink 23">
@@ -24891,7 +24893,7 @@
               </p14:xfrm>
             </p:contentPart>
           </mc:Choice>
-          <mc:Fallback>
+          <mc:Fallback xmlns="">
             <p:pic>
               <p:nvPicPr>
                 <p:cNvPr id="24" name="Ink 23">
@@ -24922,8 +24924,8 @@
             </p:pic>
           </mc:Fallback>
         </mc:AlternateContent>
-        <mc:AlternateContent xmlns:mc="http://schemas.openxmlformats.org/markup-compatibility/2006">
-          <mc:Choice xmlns:p14="http://schemas.microsoft.com/office/powerpoint/2010/main" Requires="p14">
+        <mc:AlternateContent xmlns:mc="http://schemas.openxmlformats.org/markup-compatibility/2006" xmlns:p14="http://schemas.microsoft.com/office/powerpoint/2010/main">
+          <mc:Choice Requires="p14">
             <p:contentPart p14:bwMode="auto" r:id="rId38">
               <p14:nvContentPartPr>
                 <p14:cNvPr id="25" name="Ink 24">
@@ -24942,7 +24944,7 @@
               </p14:xfrm>
             </p:contentPart>
           </mc:Choice>
-          <mc:Fallback>
+          <mc:Fallback xmlns="">
             <p:pic>
               <p:nvPicPr>
                 <p:cNvPr id="25" name="Ink 24">
@@ -24973,8 +24975,8 @@
             </p:pic>
           </mc:Fallback>
         </mc:AlternateContent>
-        <mc:AlternateContent xmlns:mc="http://schemas.openxmlformats.org/markup-compatibility/2006">
-          <mc:Choice xmlns:p14="http://schemas.microsoft.com/office/powerpoint/2010/main" Requires="p14">
+        <mc:AlternateContent xmlns:mc="http://schemas.openxmlformats.org/markup-compatibility/2006" xmlns:p14="http://schemas.microsoft.com/office/powerpoint/2010/main">
+          <mc:Choice Requires="p14">
             <p:contentPart p14:bwMode="auto" r:id="rId39">
               <p14:nvContentPartPr>
                 <p14:cNvPr id="26" name="Ink 25">
@@ -24993,7 +24995,7 @@
               </p14:xfrm>
             </p:contentPart>
           </mc:Choice>
-          <mc:Fallback>
+          <mc:Fallback xmlns="">
             <p:pic>
               <p:nvPicPr>
                 <p:cNvPr id="26" name="Ink 25">
@@ -25024,8 +25026,8 @@
             </p:pic>
           </mc:Fallback>
         </mc:AlternateContent>
-        <mc:AlternateContent xmlns:mc="http://schemas.openxmlformats.org/markup-compatibility/2006">
-          <mc:Choice xmlns:p14="http://schemas.microsoft.com/office/powerpoint/2010/main" Requires="p14">
+        <mc:AlternateContent xmlns:mc="http://schemas.openxmlformats.org/markup-compatibility/2006" xmlns:p14="http://schemas.microsoft.com/office/powerpoint/2010/main">
+          <mc:Choice Requires="p14">
             <p:contentPart p14:bwMode="auto" r:id="rId41">
               <p14:nvContentPartPr>
                 <p14:cNvPr id="27" name="Ink 26">
@@ -25044,7 +25046,7 @@
               </p14:xfrm>
             </p:contentPart>
           </mc:Choice>
-          <mc:Fallback>
+          <mc:Fallback xmlns="">
             <p:pic>
               <p:nvPicPr>
                 <p:cNvPr id="27" name="Ink 26">
@@ -25075,8 +25077,8 @@
             </p:pic>
           </mc:Fallback>
         </mc:AlternateContent>
-        <mc:AlternateContent xmlns:mc="http://schemas.openxmlformats.org/markup-compatibility/2006">
-          <mc:Choice xmlns:p14="http://schemas.microsoft.com/office/powerpoint/2010/main" Requires="p14">
+        <mc:AlternateContent xmlns:mc="http://schemas.openxmlformats.org/markup-compatibility/2006" xmlns:p14="http://schemas.microsoft.com/office/powerpoint/2010/main">
+          <mc:Choice Requires="p14">
             <p:contentPart p14:bwMode="auto" r:id="rId43">
               <p14:nvContentPartPr>
                 <p14:cNvPr id="28" name="Ink 27">
@@ -25095,7 +25097,7 @@
               </p14:xfrm>
             </p:contentPart>
           </mc:Choice>
-          <mc:Fallback>
+          <mc:Fallback xmlns="">
             <p:pic>
               <p:nvPicPr>
                 <p:cNvPr id="28" name="Ink 27">
@@ -25126,8 +25128,8 @@
             </p:pic>
           </mc:Fallback>
         </mc:AlternateContent>
-        <mc:AlternateContent xmlns:mc="http://schemas.openxmlformats.org/markup-compatibility/2006">
-          <mc:Choice xmlns:p14="http://schemas.microsoft.com/office/powerpoint/2010/main" Requires="p14">
+        <mc:AlternateContent xmlns:mc="http://schemas.openxmlformats.org/markup-compatibility/2006" xmlns:p14="http://schemas.microsoft.com/office/powerpoint/2010/main">
+          <mc:Choice Requires="p14">
             <p:contentPart p14:bwMode="auto" r:id="rId45">
               <p14:nvContentPartPr>
                 <p14:cNvPr id="29" name="Ink 28">
@@ -25146,7 +25148,7 @@
               </p14:xfrm>
             </p:contentPart>
           </mc:Choice>
-          <mc:Fallback>
+          <mc:Fallback xmlns="">
             <p:pic>
               <p:nvPicPr>
                 <p:cNvPr id="29" name="Ink 28">
@@ -25177,8 +25179,8 @@
             </p:pic>
           </mc:Fallback>
         </mc:AlternateContent>
-        <mc:AlternateContent xmlns:mc="http://schemas.openxmlformats.org/markup-compatibility/2006">
-          <mc:Choice xmlns:p14="http://schemas.microsoft.com/office/powerpoint/2010/main" Requires="p14">
+        <mc:AlternateContent xmlns:mc="http://schemas.openxmlformats.org/markup-compatibility/2006" xmlns:p14="http://schemas.microsoft.com/office/powerpoint/2010/main">
+          <mc:Choice Requires="p14">
             <p:contentPart p14:bwMode="auto" r:id="rId47">
               <p14:nvContentPartPr>
                 <p14:cNvPr id="30" name="Ink 29">
@@ -25197,7 +25199,7 @@
               </p14:xfrm>
             </p:contentPart>
           </mc:Choice>
-          <mc:Fallback>
+          <mc:Fallback xmlns="">
             <p:pic>
               <p:nvPicPr>
                 <p:cNvPr id="30" name="Ink 29">
@@ -25228,8 +25230,8 @@
             </p:pic>
           </mc:Fallback>
         </mc:AlternateContent>
-        <mc:AlternateContent xmlns:mc="http://schemas.openxmlformats.org/markup-compatibility/2006">
-          <mc:Choice xmlns:p14="http://schemas.microsoft.com/office/powerpoint/2010/main" Requires="p14">
+        <mc:AlternateContent xmlns:mc="http://schemas.openxmlformats.org/markup-compatibility/2006" xmlns:p14="http://schemas.microsoft.com/office/powerpoint/2010/main">
+          <mc:Choice Requires="p14">
             <p:contentPart p14:bwMode="auto" r:id="rId49">
               <p14:nvContentPartPr>
                 <p14:cNvPr id="31" name="Ink 30">
@@ -25248,7 +25250,7 @@
               </p14:xfrm>
             </p:contentPart>
           </mc:Choice>
-          <mc:Fallback>
+          <mc:Fallback xmlns="">
             <p:pic>
               <p:nvPicPr>
                 <p:cNvPr id="31" name="Ink 30">
@@ -25279,8 +25281,8 @@
             </p:pic>
           </mc:Fallback>
         </mc:AlternateContent>
-        <mc:AlternateContent xmlns:mc="http://schemas.openxmlformats.org/markup-compatibility/2006">
-          <mc:Choice xmlns:p14="http://schemas.microsoft.com/office/powerpoint/2010/main" Requires="p14">
+        <mc:AlternateContent xmlns:mc="http://schemas.openxmlformats.org/markup-compatibility/2006" xmlns:p14="http://schemas.microsoft.com/office/powerpoint/2010/main">
+          <mc:Choice Requires="p14">
             <p:contentPart p14:bwMode="auto" r:id="rId51">
               <p14:nvContentPartPr>
                 <p14:cNvPr id="32" name="Ink 31">
@@ -25299,7 +25301,7 @@
               </p14:xfrm>
             </p:contentPart>
           </mc:Choice>
-          <mc:Fallback>
+          <mc:Fallback xmlns="">
             <p:pic>
               <p:nvPicPr>
                 <p:cNvPr id="32" name="Ink 31">
@@ -29706,8 +29708,8 @@
           </a:p>
         </p:txBody>
       </p:sp>
-      <mc:AlternateContent xmlns:mc="http://schemas.openxmlformats.org/markup-compatibility/2006">
-        <mc:Choice xmlns:p14="http://schemas.microsoft.com/office/powerpoint/2010/main" Requires="p14">
+      <mc:AlternateContent xmlns:mc="http://schemas.openxmlformats.org/markup-compatibility/2006" xmlns:p14="http://schemas.microsoft.com/office/powerpoint/2010/main">
+        <mc:Choice Requires="p14">
           <p:contentPart p14:bwMode="auto" r:id="rId2">
             <p14:nvContentPartPr>
               <p14:cNvPr id="7" name="Ink 6">
@@ -29726,7 +29728,7 @@
             </p14:xfrm>
           </p:contentPart>
         </mc:Choice>
-        <mc:Fallback>
+        <mc:Fallback xmlns="">
           <p:pic>
             <p:nvPicPr>
               <p:cNvPr id="7" name="Ink 6">
@@ -29757,8 +29759,8 @@
           </p:pic>
         </mc:Fallback>
       </mc:AlternateContent>
-      <mc:AlternateContent xmlns:mc="http://schemas.openxmlformats.org/markup-compatibility/2006">
-        <mc:Choice xmlns:p14="http://schemas.microsoft.com/office/powerpoint/2010/main" Requires="p14">
+      <mc:AlternateContent xmlns:mc="http://schemas.openxmlformats.org/markup-compatibility/2006" xmlns:p14="http://schemas.microsoft.com/office/powerpoint/2010/main">
+        <mc:Choice Requires="p14">
           <p:contentPart p14:bwMode="auto" r:id="rId4">
             <p14:nvContentPartPr>
               <p14:cNvPr id="8" name="Ink 7">
@@ -29777,7 +29779,7 @@
             </p14:xfrm>
           </p:contentPart>
         </mc:Choice>
-        <mc:Fallback>
+        <mc:Fallback xmlns="">
           <p:pic>
             <p:nvPicPr>
               <p:cNvPr id="8" name="Ink 7">
@@ -29808,8 +29810,8 @@
           </p:pic>
         </mc:Fallback>
       </mc:AlternateContent>
-      <mc:AlternateContent xmlns:mc="http://schemas.openxmlformats.org/markup-compatibility/2006">
-        <mc:Choice xmlns:p14="http://schemas.microsoft.com/office/powerpoint/2010/main" Requires="p14">
+      <mc:AlternateContent xmlns:mc="http://schemas.openxmlformats.org/markup-compatibility/2006" xmlns:p14="http://schemas.microsoft.com/office/powerpoint/2010/main">
+        <mc:Choice Requires="p14">
           <p:contentPart p14:bwMode="auto" r:id="rId6">
             <p14:nvContentPartPr>
               <p14:cNvPr id="10" name="Ink 9">
@@ -29828,7 +29830,7 @@
             </p14:xfrm>
           </p:contentPart>
         </mc:Choice>
-        <mc:Fallback>
+        <mc:Fallback xmlns="">
           <p:pic>
             <p:nvPicPr>
               <p:cNvPr id="10" name="Ink 9">
@@ -29859,8 +29861,8 @@
           </p:pic>
         </mc:Fallback>
       </mc:AlternateContent>
-      <mc:AlternateContent xmlns:mc="http://schemas.openxmlformats.org/markup-compatibility/2006">
-        <mc:Choice xmlns:p14="http://schemas.microsoft.com/office/powerpoint/2010/main" Requires="p14">
+      <mc:AlternateContent xmlns:mc="http://schemas.openxmlformats.org/markup-compatibility/2006" xmlns:p14="http://schemas.microsoft.com/office/powerpoint/2010/main">
+        <mc:Choice Requires="p14">
           <p:contentPart p14:bwMode="auto" r:id="rId8">
             <p14:nvContentPartPr>
               <p14:cNvPr id="11" name="Ink 10">
@@ -29879,7 +29881,7 @@
             </p14:xfrm>
           </p:contentPart>
         </mc:Choice>
-        <mc:Fallback>
+        <mc:Fallback xmlns="">
           <p:pic>
             <p:nvPicPr>
               <p:cNvPr id="11" name="Ink 10">
@@ -34666,8 +34668,8 @@
           </a:p>
         </p:txBody>
       </p:sp>
-      <mc:AlternateContent xmlns:mc="http://schemas.openxmlformats.org/markup-compatibility/2006">
-        <mc:Choice xmlns:p14="http://schemas.microsoft.com/office/powerpoint/2010/main" Requires="p14">
+      <mc:AlternateContent xmlns:mc="http://schemas.openxmlformats.org/markup-compatibility/2006" xmlns:p14="http://schemas.microsoft.com/office/powerpoint/2010/main">
+        <mc:Choice Requires="p14">
           <p:contentPart p14:bwMode="auto" r:id="rId2">
             <p14:nvContentPartPr>
               <p14:cNvPr id="6" name="Ink 5">
@@ -34686,7 +34688,7 @@
             </p14:xfrm>
           </p:contentPart>
         </mc:Choice>
-        <mc:Fallback>
+        <mc:Fallback xmlns="">
           <p:pic>
             <p:nvPicPr>
               <p:cNvPr id="6" name="Ink 5">
@@ -35693,8 +35695,8 @@
           </a:p>
         </p:txBody>
       </p:sp>
-      <mc:AlternateContent xmlns:mc="http://schemas.openxmlformats.org/markup-compatibility/2006">
-        <mc:Choice xmlns:p14="http://schemas.microsoft.com/office/powerpoint/2010/main" Requires="p14">
+      <mc:AlternateContent xmlns:mc="http://schemas.openxmlformats.org/markup-compatibility/2006" xmlns:p14="http://schemas.microsoft.com/office/powerpoint/2010/main">
+        <mc:Choice Requires="p14">
           <p:contentPart p14:bwMode="auto" r:id="rId2">
             <p14:nvContentPartPr>
               <p14:cNvPr id="4" name="Ink 3">
@@ -35713,7 +35715,7 @@
             </p14:xfrm>
           </p:contentPart>
         </mc:Choice>
-        <mc:Fallback>
+        <mc:Fallback xmlns="">
           <p:pic>
             <p:nvPicPr>
               <p:cNvPr id="4" name="Ink 3">
@@ -36100,10 +36102,1499 @@
         </p:nvSpPr>
         <p:spPr/>
         <p:txBody>
-          <a:bodyPr/>
+          <a:bodyPr>
+            <a:normAutofit fontScale="62500" lnSpcReduction="20000"/>
+          </a:bodyPr>
           <a:lstStyle/>
           <a:p>
-            <a:endParaRPr lang="ru-RU"/>
+            <a:pPr marL="0" indent="0">
+              <a:buNone/>
+            </a:pPr>
+            <a:r>
+              <a:rPr lang="en-US" dirty="0" err="1">
+                <a:solidFill>
+                  <a:srgbClr val="0033B3"/>
+                </a:solidFill>
+                <a:effectLst/>
+                <a:latin typeface="JetBrains Mono"/>
+              </a:rPr>
+              <a:t>fn</a:t>
+            </a:r>
+            <a:r>
+              <a:rPr lang="en-US" dirty="0">
+                <a:solidFill>
+                  <a:srgbClr val="0033B3"/>
+                </a:solidFill>
+                <a:effectLst/>
+                <a:latin typeface="JetBrains Mono"/>
+              </a:rPr>
+              <a:t> </a:t>
+            </a:r>
+            <a:r>
+              <a:rPr lang="en-US" dirty="0">
+                <a:solidFill>
+                  <a:srgbClr val="00627A"/>
+                </a:solidFill>
+                <a:effectLst/>
+                <a:latin typeface="JetBrains Mono"/>
+              </a:rPr>
+              <a:t>main</a:t>
+            </a:r>
+            <a:r>
+              <a:rPr lang="en-US" dirty="0">
+                <a:solidFill>
+                  <a:srgbClr val="080808"/>
+                </a:solidFill>
+                <a:effectLst/>
+                <a:latin typeface="JetBrains Mono"/>
+              </a:rPr>
+              <a:t>() {</a:t>
+            </a:r>
+            <a:br>
+              <a:rPr lang="en-US" dirty="0">
+                <a:solidFill>
+                  <a:srgbClr val="080808"/>
+                </a:solidFill>
+                <a:effectLst/>
+                <a:latin typeface="JetBrains Mono"/>
+              </a:rPr>
+            </a:br>
+            <a:r>
+              <a:rPr lang="en-US" dirty="0">
+                <a:solidFill>
+                  <a:srgbClr val="080808"/>
+                </a:solidFill>
+                <a:effectLst/>
+                <a:latin typeface="JetBrains Mono"/>
+              </a:rPr>
+              <a:t>    </a:t>
+            </a:r>
+            <a:r>
+              <a:rPr lang="en-US" dirty="0">
+                <a:solidFill>
+                  <a:srgbClr val="0033B3"/>
+                </a:solidFill>
+                <a:effectLst/>
+                <a:latin typeface="JetBrains Mono"/>
+              </a:rPr>
+              <a:t>let mut </a:t>
+            </a:r>
+            <a:r>
+              <a:rPr lang="en-US" dirty="0">
+                <a:solidFill>
+                  <a:srgbClr val="000000"/>
+                </a:solidFill>
+                <a:effectLst/>
+                <a:latin typeface="JetBrains Mono"/>
+              </a:rPr>
+              <a:t>person </a:t>
+            </a:r>
+            <a:r>
+              <a:rPr lang="en-US" dirty="0">
+                <a:solidFill>
+                  <a:srgbClr val="080808"/>
+                </a:solidFill>
+                <a:effectLst/>
+                <a:latin typeface="JetBrains Mono"/>
+              </a:rPr>
+              <a:t>= </a:t>
+            </a:r>
+            <a:r>
+              <a:rPr lang="en-US" dirty="0">
+                <a:solidFill>
+                  <a:srgbClr val="000000"/>
+                </a:solidFill>
+                <a:effectLst/>
+                <a:latin typeface="JetBrains Mono"/>
+              </a:rPr>
+              <a:t>Person</a:t>
+            </a:r>
+            <a:r>
+              <a:rPr lang="en-US" dirty="0">
+                <a:solidFill>
+                  <a:srgbClr val="080808"/>
+                </a:solidFill>
+                <a:effectLst/>
+                <a:latin typeface="JetBrains Mono"/>
+              </a:rPr>
+              <a:t>::</a:t>
+            </a:r>
+            <a:r>
+              <a:rPr lang="en-US" i="1" dirty="0">
+                <a:solidFill>
+                  <a:srgbClr val="00627A"/>
+                </a:solidFill>
+                <a:effectLst/>
+                <a:latin typeface="JetBrains Mono"/>
+              </a:rPr>
+              <a:t>new</a:t>
+            </a:r>
+            <a:r>
+              <a:rPr lang="en-US" dirty="0">
+                <a:solidFill>
+                  <a:srgbClr val="080808"/>
+                </a:solidFill>
+                <a:effectLst/>
+                <a:latin typeface="JetBrains Mono"/>
+              </a:rPr>
+              <a:t>(</a:t>
+            </a:r>
+            <a:r>
+              <a:rPr lang="en-US" dirty="0">
+                <a:solidFill>
+                  <a:srgbClr val="1750EB"/>
+                </a:solidFill>
+                <a:effectLst/>
+                <a:latin typeface="JetBrains Mono"/>
+              </a:rPr>
+              <a:t>42</a:t>
+            </a:r>
+            <a:r>
+              <a:rPr lang="en-US" dirty="0">
+                <a:solidFill>
+                  <a:srgbClr val="080808"/>
+                </a:solidFill>
+                <a:effectLst/>
+                <a:latin typeface="JetBrains Mono"/>
+              </a:rPr>
+              <a:t>, (</a:t>
+            </a:r>
+            <a:r>
+              <a:rPr lang="en-US" dirty="0">
+                <a:solidFill>
+                  <a:srgbClr val="0033B3"/>
+                </a:solidFill>
+                <a:effectLst/>
+                <a:latin typeface="JetBrains Mono"/>
+              </a:rPr>
+              <a:t>false</a:t>
+            </a:r>
+            <a:r>
+              <a:rPr lang="en-US" dirty="0">
+                <a:solidFill>
+                  <a:srgbClr val="080808"/>
+                </a:solidFill>
+                <a:effectLst/>
+                <a:latin typeface="JetBrains Mono"/>
+              </a:rPr>
+              <a:t>, </a:t>
+            </a:r>
+            <a:r>
+              <a:rPr lang="en-US" dirty="0">
+                <a:solidFill>
+                  <a:srgbClr val="1750EB"/>
+                </a:solidFill>
+                <a:effectLst/>
+                <a:latin typeface="JetBrains Mono"/>
+              </a:rPr>
+              <a:t>0</a:t>
+            </a:r>
+            <a:r>
+              <a:rPr lang="en-US" dirty="0">
+                <a:solidFill>
+                  <a:srgbClr val="080808"/>
+                </a:solidFill>
+                <a:effectLst/>
+                <a:latin typeface="JetBrains Mono"/>
+              </a:rPr>
+              <a:t>), </a:t>
+            </a:r>
+            <a:r>
+              <a:rPr lang="en-US" dirty="0">
+                <a:solidFill>
+                  <a:srgbClr val="000000"/>
+                </a:solidFill>
+                <a:effectLst/>
+                <a:latin typeface="JetBrains Mono"/>
+              </a:rPr>
+              <a:t>String</a:t>
+            </a:r>
+            <a:r>
+              <a:rPr lang="en-US" dirty="0">
+                <a:solidFill>
+                  <a:srgbClr val="080808"/>
+                </a:solidFill>
+                <a:effectLst/>
+                <a:latin typeface="JetBrains Mono"/>
+              </a:rPr>
+              <a:t>::</a:t>
+            </a:r>
+            <a:r>
+              <a:rPr lang="en-US" i="1" dirty="0">
+                <a:solidFill>
+                  <a:srgbClr val="00627A"/>
+                </a:solidFill>
+                <a:effectLst/>
+                <a:latin typeface="JetBrains Mono"/>
+              </a:rPr>
+              <a:t>from</a:t>
+            </a:r>
+            <a:r>
+              <a:rPr lang="en-US" dirty="0">
+                <a:solidFill>
+                  <a:srgbClr val="080808"/>
+                </a:solidFill>
+                <a:effectLst/>
+                <a:latin typeface="JetBrains Mono"/>
+              </a:rPr>
+              <a:t>(</a:t>
+            </a:r>
+            <a:r>
+              <a:rPr lang="en-US" dirty="0">
+                <a:solidFill>
+                  <a:srgbClr val="067D17"/>
+                </a:solidFill>
+                <a:effectLst/>
+                <a:latin typeface="JetBrains Mono"/>
+              </a:rPr>
+              <a:t>"Graydon Hoare"</a:t>
+            </a:r>
+            <a:r>
+              <a:rPr lang="en-US" dirty="0">
+                <a:solidFill>
+                  <a:srgbClr val="080808"/>
+                </a:solidFill>
+                <a:effectLst/>
+                <a:latin typeface="JetBrains Mono"/>
+              </a:rPr>
+              <a:t>),</a:t>
+            </a:r>
+            <a:br>
+              <a:rPr lang="en-US" dirty="0">
+                <a:solidFill>
+                  <a:srgbClr val="080808"/>
+                </a:solidFill>
+                <a:effectLst/>
+                <a:latin typeface="JetBrains Mono"/>
+              </a:rPr>
+            </a:br>
+            <a:r>
+              <a:rPr lang="en-US" dirty="0">
+                <a:solidFill>
+                  <a:srgbClr val="080808"/>
+                </a:solidFill>
+                <a:effectLst/>
+                <a:latin typeface="JetBrains Mono"/>
+              </a:rPr>
+              <a:t>                                 </a:t>
+            </a:r>
+            <a:r>
+              <a:rPr lang="en-US" dirty="0" err="1">
+                <a:solidFill>
+                  <a:srgbClr val="000000"/>
+                </a:solidFill>
+                <a:effectLst/>
+                <a:latin typeface="JetBrains Mono"/>
+              </a:rPr>
+              <a:t>PassportNumber</a:t>
+            </a:r>
+            <a:r>
+              <a:rPr lang="en-US" dirty="0">
+                <a:solidFill>
+                  <a:srgbClr val="080808"/>
+                </a:solidFill>
+                <a:effectLst/>
+                <a:latin typeface="JetBrains Mono"/>
+              </a:rPr>
+              <a:t>(</a:t>
+            </a:r>
+            <a:r>
+              <a:rPr lang="en-US" dirty="0">
+                <a:solidFill>
+                  <a:srgbClr val="1750EB"/>
+                </a:solidFill>
+                <a:effectLst/>
+                <a:latin typeface="JetBrains Mono"/>
+              </a:rPr>
+              <a:t>111</a:t>
+            </a:r>
+            <a:r>
+              <a:rPr lang="en-US" dirty="0">
+                <a:solidFill>
+                  <a:srgbClr val="080808"/>
+                </a:solidFill>
+                <a:effectLst/>
+                <a:latin typeface="JetBrains Mono"/>
+              </a:rPr>
+              <a:t>, </a:t>
+            </a:r>
+            <a:r>
+              <a:rPr lang="en-US" dirty="0">
+                <a:solidFill>
+                  <a:srgbClr val="1750EB"/>
+                </a:solidFill>
+                <a:effectLst/>
+                <a:latin typeface="JetBrains Mono"/>
+              </a:rPr>
+              <a:t>222</a:t>
+            </a:r>
+            <a:r>
+              <a:rPr lang="en-US" dirty="0">
+                <a:solidFill>
+                  <a:srgbClr val="080808"/>
+                </a:solidFill>
+                <a:effectLst/>
+                <a:latin typeface="JetBrains Mono"/>
+              </a:rPr>
+              <a:t>));</a:t>
+            </a:r>
+            <a:br>
+              <a:rPr lang="en-US" dirty="0">
+                <a:solidFill>
+                  <a:srgbClr val="080808"/>
+                </a:solidFill>
+                <a:effectLst/>
+                <a:latin typeface="JetBrains Mono"/>
+              </a:rPr>
+            </a:br>
+            <a:br>
+              <a:rPr lang="en-US" dirty="0">
+                <a:solidFill>
+                  <a:srgbClr val="080808"/>
+                </a:solidFill>
+                <a:effectLst/>
+                <a:latin typeface="JetBrains Mono"/>
+              </a:rPr>
+            </a:br>
+            <a:r>
+              <a:rPr lang="en-US" dirty="0">
+                <a:solidFill>
+                  <a:srgbClr val="080808"/>
+                </a:solidFill>
+                <a:effectLst/>
+                <a:latin typeface="JetBrains Mono"/>
+              </a:rPr>
+              <a:t>    </a:t>
+            </a:r>
+            <a:r>
+              <a:rPr lang="en-US" dirty="0" err="1">
+                <a:solidFill>
+                  <a:srgbClr val="DD6718"/>
+                </a:solidFill>
+                <a:effectLst/>
+                <a:latin typeface="JetBrains Mono"/>
+              </a:rPr>
+              <a:t>assert_eq</a:t>
+            </a:r>
+            <a:r>
+              <a:rPr lang="en-US" dirty="0">
+                <a:solidFill>
+                  <a:srgbClr val="DD6718"/>
+                </a:solidFill>
+                <a:effectLst/>
+                <a:latin typeface="JetBrains Mono"/>
+              </a:rPr>
+              <a:t>!</a:t>
+            </a:r>
+            <a:r>
+              <a:rPr lang="en-US" dirty="0">
+                <a:solidFill>
+                  <a:srgbClr val="080808"/>
+                </a:solidFill>
+                <a:effectLst/>
+                <a:latin typeface="JetBrains Mono"/>
+              </a:rPr>
+              <a:t>(</a:t>
+            </a:r>
+            <a:r>
+              <a:rPr lang="en-US" dirty="0">
+                <a:solidFill>
+                  <a:srgbClr val="067D17"/>
+                </a:solidFill>
+                <a:effectLst/>
+                <a:latin typeface="JetBrains Mono"/>
+              </a:rPr>
+              <a:t>"Graydon Hoare"</a:t>
+            </a:r>
+            <a:r>
+              <a:rPr lang="en-US" dirty="0">
+                <a:solidFill>
+                  <a:srgbClr val="080808"/>
+                </a:solidFill>
+                <a:effectLst/>
+                <a:latin typeface="JetBrains Mono"/>
+              </a:rPr>
+              <a:t>, </a:t>
+            </a:r>
+            <a:r>
+              <a:rPr lang="en-US" dirty="0">
+                <a:solidFill>
+                  <a:srgbClr val="DD6718"/>
+                </a:solidFill>
+                <a:effectLst/>
+                <a:latin typeface="JetBrains Mono"/>
+              </a:rPr>
+              <a:t>format!</a:t>
+            </a:r>
+            <a:r>
+              <a:rPr lang="en-US" dirty="0">
+                <a:solidFill>
+                  <a:srgbClr val="080808"/>
+                </a:solidFill>
+                <a:effectLst/>
+                <a:latin typeface="JetBrains Mono"/>
+              </a:rPr>
+              <a:t>(</a:t>
+            </a:r>
+            <a:r>
+              <a:rPr lang="en-US" dirty="0">
+                <a:solidFill>
+                  <a:srgbClr val="067D17"/>
+                </a:solidFill>
+                <a:effectLst/>
+                <a:latin typeface="JetBrains Mono"/>
+              </a:rPr>
+              <a:t>"</a:t>
+            </a:r>
+            <a:r>
+              <a:rPr lang="en-US" dirty="0">
+                <a:solidFill>
+                  <a:srgbClr val="0037A6"/>
+                </a:solidFill>
+                <a:effectLst/>
+                <a:latin typeface="JetBrains Mono"/>
+              </a:rPr>
+              <a:t>{}</a:t>
+            </a:r>
+            <a:r>
+              <a:rPr lang="en-US" dirty="0">
+                <a:solidFill>
+                  <a:srgbClr val="067D17"/>
+                </a:solidFill>
+                <a:effectLst/>
+                <a:latin typeface="JetBrains Mono"/>
+              </a:rPr>
+              <a:t>"</a:t>
+            </a:r>
+            <a:r>
+              <a:rPr lang="en-US" dirty="0">
+                <a:solidFill>
+                  <a:srgbClr val="080808"/>
+                </a:solidFill>
+                <a:effectLst/>
+                <a:latin typeface="JetBrains Mono"/>
+              </a:rPr>
+              <a:t>, </a:t>
+            </a:r>
+            <a:r>
+              <a:rPr lang="en-US" dirty="0">
+                <a:solidFill>
+                  <a:srgbClr val="000000"/>
+                </a:solidFill>
+                <a:effectLst/>
+                <a:latin typeface="JetBrains Mono"/>
+              </a:rPr>
+              <a:t>person</a:t>
+            </a:r>
+            <a:r>
+              <a:rPr lang="en-US" dirty="0">
+                <a:solidFill>
+                  <a:srgbClr val="080808"/>
+                </a:solidFill>
+                <a:effectLst/>
+                <a:latin typeface="JetBrains Mono"/>
+              </a:rPr>
+              <a:t>));</a:t>
+            </a:r>
+            <a:br>
+              <a:rPr lang="en-US" dirty="0">
+                <a:solidFill>
+                  <a:srgbClr val="080808"/>
+                </a:solidFill>
+                <a:effectLst/>
+                <a:latin typeface="JetBrains Mono"/>
+              </a:rPr>
+            </a:br>
+            <a:br>
+              <a:rPr lang="en-US" dirty="0">
+                <a:solidFill>
+                  <a:srgbClr val="080808"/>
+                </a:solidFill>
+                <a:effectLst/>
+                <a:latin typeface="JetBrains Mono"/>
+              </a:rPr>
+            </a:br>
+            <a:r>
+              <a:rPr lang="en-US" dirty="0">
+                <a:solidFill>
+                  <a:srgbClr val="080808"/>
+                </a:solidFill>
+                <a:effectLst/>
+                <a:latin typeface="JetBrains Mono"/>
+              </a:rPr>
+              <a:t>    </a:t>
+            </a:r>
+            <a:r>
+              <a:rPr lang="en-US" dirty="0" err="1">
+                <a:solidFill>
+                  <a:srgbClr val="DD6718"/>
+                </a:solidFill>
+                <a:effectLst/>
+                <a:latin typeface="JetBrains Mono"/>
+              </a:rPr>
+              <a:t>assert_eq</a:t>
+            </a:r>
+            <a:r>
+              <a:rPr lang="en-US" dirty="0">
+                <a:solidFill>
+                  <a:srgbClr val="DD6718"/>
+                </a:solidFill>
+                <a:effectLst/>
+                <a:latin typeface="JetBrains Mono"/>
+              </a:rPr>
+              <a:t>!</a:t>
+            </a:r>
+            <a:r>
+              <a:rPr lang="en-US" dirty="0">
+                <a:solidFill>
+                  <a:srgbClr val="080808"/>
+                </a:solidFill>
+                <a:effectLst/>
+                <a:latin typeface="JetBrains Mono"/>
+              </a:rPr>
+              <a:t>(</a:t>
+            </a:r>
+            <a:r>
+              <a:rPr lang="en-US" dirty="0">
+                <a:solidFill>
+                  <a:srgbClr val="1750EB"/>
+                </a:solidFill>
+                <a:effectLst/>
+                <a:latin typeface="JetBrains Mono"/>
+              </a:rPr>
+              <a:t>42</a:t>
+            </a:r>
+            <a:r>
+              <a:rPr lang="en-US" dirty="0">
+                <a:solidFill>
+                  <a:srgbClr val="080808"/>
+                </a:solidFill>
+                <a:effectLst/>
+                <a:latin typeface="JetBrains Mono"/>
+              </a:rPr>
+              <a:t>, </a:t>
+            </a:r>
+            <a:r>
+              <a:rPr lang="en-US" dirty="0" err="1">
+                <a:solidFill>
+                  <a:srgbClr val="000000"/>
+                </a:solidFill>
+                <a:effectLst/>
+                <a:latin typeface="JetBrains Mono"/>
+              </a:rPr>
+              <a:t>person</a:t>
+            </a:r>
+            <a:r>
+              <a:rPr lang="en-US" dirty="0" err="1">
+                <a:solidFill>
+                  <a:srgbClr val="080808"/>
+                </a:solidFill>
+                <a:effectLst/>
+                <a:latin typeface="JetBrains Mono"/>
+              </a:rPr>
+              <a:t>.get_id</a:t>
+            </a:r>
+            <a:r>
+              <a:rPr lang="en-US" dirty="0">
+                <a:solidFill>
+                  <a:srgbClr val="080808"/>
+                </a:solidFill>
+                <a:effectLst/>
+                <a:latin typeface="JetBrains Mono"/>
+              </a:rPr>
+              <a:t>());</a:t>
+            </a:r>
+            <a:br>
+              <a:rPr lang="en-US" dirty="0">
+                <a:solidFill>
+                  <a:srgbClr val="080808"/>
+                </a:solidFill>
+                <a:effectLst/>
+                <a:latin typeface="JetBrains Mono"/>
+              </a:rPr>
+            </a:br>
+            <a:br>
+              <a:rPr lang="en-US" dirty="0">
+                <a:solidFill>
+                  <a:srgbClr val="080808"/>
+                </a:solidFill>
+                <a:effectLst/>
+                <a:latin typeface="JetBrains Mono"/>
+              </a:rPr>
+            </a:br>
+            <a:r>
+              <a:rPr lang="en-US" dirty="0">
+                <a:solidFill>
+                  <a:srgbClr val="080808"/>
+                </a:solidFill>
+                <a:effectLst/>
+                <a:latin typeface="JetBrains Mono"/>
+              </a:rPr>
+              <a:t>    </a:t>
+            </a:r>
+            <a:r>
+              <a:rPr lang="en-US" dirty="0" err="1">
+                <a:solidFill>
+                  <a:srgbClr val="000000"/>
+                </a:solidFill>
+                <a:effectLst/>
+                <a:latin typeface="JetBrains Mono"/>
+              </a:rPr>
+              <a:t>person</a:t>
+            </a:r>
+            <a:r>
+              <a:rPr lang="en-US" dirty="0" err="1">
+                <a:solidFill>
+                  <a:srgbClr val="080808"/>
+                </a:solidFill>
+                <a:effectLst/>
+                <a:latin typeface="JetBrains Mono"/>
+              </a:rPr>
+              <a:t>.specify_age</a:t>
+            </a:r>
+            <a:r>
+              <a:rPr lang="en-US" dirty="0">
+                <a:solidFill>
+                  <a:srgbClr val="080808"/>
+                </a:solidFill>
+                <a:effectLst/>
+                <a:latin typeface="JetBrains Mono"/>
+              </a:rPr>
+              <a:t>(</a:t>
+            </a:r>
+            <a:r>
+              <a:rPr lang="en-US" dirty="0">
+                <a:solidFill>
+                  <a:srgbClr val="1750EB"/>
+                </a:solidFill>
+                <a:effectLst/>
+                <a:latin typeface="JetBrains Mono"/>
+              </a:rPr>
+              <a:t>50</a:t>
+            </a:r>
+            <a:r>
+              <a:rPr lang="en-US" dirty="0">
+                <a:solidFill>
+                  <a:srgbClr val="080808"/>
+                </a:solidFill>
+                <a:effectLst/>
+                <a:latin typeface="JetBrains Mono"/>
+              </a:rPr>
+              <a:t>);</a:t>
+            </a:r>
+            <a:br>
+              <a:rPr lang="en-US" dirty="0">
+                <a:solidFill>
+                  <a:srgbClr val="080808"/>
+                </a:solidFill>
+                <a:effectLst/>
+                <a:latin typeface="JetBrains Mono"/>
+              </a:rPr>
+            </a:br>
+            <a:r>
+              <a:rPr lang="en-US" dirty="0">
+                <a:solidFill>
+                  <a:srgbClr val="080808"/>
+                </a:solidFill>
+                <a:effectLst/>
+                <a:latin typeface="JetBrains Mono"/>
+              </a:rPr>
+              <a:t>    </a:t>
+            </a:r>
+            <a:r>
+              <a:rPr lang="en-US" dirty="0" err="1">
+                <a:solidFill>
+                  <a:srgbClr val="DD6718"/>
+                </a:solidFill>
+                <a:effectLst/>
+                <a:latin typeface="JetBrains Mono"/>
+              </a:rPr>
+              <a:t>assert_eq</a:t>
+            </a:r>
+            <a:r>
+              <a:rPr lang="en-US" dirty="0">
+                <a:solidFill>
+                  <a:srgbClr val="DD6718"/>
+                </a:solidFill>
+                <a:effectLst/>
+                <a:latin typeface="JetBrains Mono"/>
+              </a:rPr>
+              <a:t>!</a:t>
+            </a:r>
+            <a:r>
+              <a:rPr lang="en-US" dirty="0">
+                <a:solidFill>
+                  <a:srgbClr val="080808"/>
+                </a:solidFill>
+                <a:effectLst/>
+                <a:latin typeface="JetBrains Mono"/>
+              </a:rPr>
+              <a:t>((</a:t>
+            </a:r>
+            <a:r>
+              <a:rPr lang="en-US" dirty="0">
+                <a:solidFill>
+                  <a:srgbClr val="0033B3"/>
+                </a:solidFill>
+                <a:effectLst/>
+                <a:latin typeface="JetBrains Mono"/>
+              </a:rPr>
+              <a:t>true</a:t>
+            </a:r>
+            <a:r>
+              <a:rPr lang="en-US" dirty="0">
+                <a:solidFill>
+                  <a:srgbClr val="080808"/>
+                </a:solidFill>
+                <a:effectLst/>
+                <a:latin typeface="JetBrains Mono"/>
+              </a:rPr>
+              <a:t>, </a:t>
+            </a:r>
+            <a:r>
+              <a:rPr lang="en-US" dirty="0">
+                <a:solidFill>
+                  <a:srgbClr val="1750EB"/>
+                </a:solidFill>
+                <a:effectLst/>
+                <a:latin typeface="JetBrains Mono"/>
+              </a:rPr>
+              <a:t>50</a:t>
+            </a:r>
+            <a:r>
+              <a:rPr lang="en-US" dirty="0">
+                <a:solidFill>
+                  <a:srgbClr val="080808"/>
+                </a:solidFill>
+                <a:effectLst/>
+                <a:latin typeface="JetBrains Mono"/>
+              </a:rPr>
+              <a:t>), </a:t>
+            </a:r>
+            <a:r>
+              <a:rPr lang="en-US" dirty="0" err="1">
+                <a:solidFill>
+                  <a:srgbClr val="000000"/>
+                </a:solidFill>
+                <a:effectLst/>
+                <a:latin typeface="JetBrains Mono"/>
+              </a:rPr>
+              <a:t>person</a:t>
+            </a:r>
+            <a:r>
+              <a:rPr lang="en-US" dirty="0" err="1">
+                <a:solidFill>
+                  <a:srgbClr val="080808"/>
+                </a:solidFill>
+                <a:effectLst/>
+                <a:latin typeface="JetBrains Mono"/>
+              </a:rPr>
+              <a:t>.</a:t>
+            </a:r>
+            <a:r>
+              <a:rPr lang="en-US" dirty="0" err="1">
+                <a:solidFill>
+                  <a:srgbClr val="871094"/>
+                </a:solidFill>
+                <a:effectLst/>
+                <a:latin typeface="JetBrains Mono"/>
+              </a:rPr>
+              <a:t>age_if_specified</a:t>
+            </a:r>
+            <a:r>
+              <a:rPr lang="en-US" dirty="0">
+                <a:solidFill>
+                  <a:srgbClr val="080808"/>
+                </a:solidFill>
+                <a:effectLst/>
+                <a:latin typeface="JetBrains Mono"/>
+              </a:rPr>
+              <a:t>);</a:t>
+            </a:r>
+            <a:br>
+              <a:rPr lang="en-US" dirty="0">
+                <a:solidFill>
+                  <a:srgbClr val="080808"/>
+                </a:solidFill>
+                <a:effectLst/>
+                <a:latin typeface="JetBrains Mono"/>
+              </a:rPr>
+            </a:br>
+            <a:br>
+              <a:rPr lang="en-US" dirty="0">
+                <a:solidFill>
+                  <a:srgbClr val="080808"/>
+                </a:solidFill>
+                <a:effectLst/>
+                <a:latin typeface="JetBrains Mono"/>
+              </a:rPr>
+            </a:br>
+            <a:r>
+              <a:rPr lang="en-US" dirty="0">
+                <a:solidFill>
+                  <a:srgbClr val="080808"/>
+                </a:solidFill>
+                <a:effectLst/>
+                <a:latin typeface="JetBrains Mono"/>
+              </a:rPr>
+              <a:t>    </a:t>
+            </a:r>
+            <a:r>
+              <a:rPr lang="en-US" dirty="0" err="1">
+                <a:solidFill>
+                  <a:srgbClr val="DD6718"/>
+                </a:solidFill>
+                <a:effectLst/>
+                <a:latin typeface="JetBrains Mono"/>
+              </a:rPr>
+              <a:t>assert_eq</a:t>
+            </a:r>
+            <a:r>
+              <a:rPr lang="en-US" dirty="0">
+                <a:solidFill>
+                  <a:srgbClr val="DD6718"/>
+                </a:solidFill>
+                <a:effectLst/>
+                <a:latin typeface="JetBrains Mono"/>
+              </a:rPr>
+              <a:t>!</a:t>
+            </a:r>
+            <a:r>
+              <a:rPr lang="en-US" dirty="0">
+                <a:solidFill>
+                  <a:srgbClr val="080808"/>
+                </a:solidFill>
+                <a:effectLst/>
+                <a:latin typeface="JetBrains Mono"/>
+              </a:rPr>
+              <a:t>(</a:t>
+            </a:r>
+            <a:r>
+              <a:rPr lang="en-US" dirty="0">
+                <a:solidFill>
+                  <a:srgbClr val="067D17"/>
+                </a:solidFill>
+                <a:effectLst/>
+                <a:latin typeface="JetBrains Mono"/>
+              </a:rPr>
+              <a:t>"Graydon Hoare: 50 years"</a:t>
+            </a:r>
+            <a:r>
+              <a:rPr lang="en-US" dirty="0">
+                <a:solidFill>
+                  <a:srgbClr val="080808"/>
+                </a:solidFill>
+                <a:effectLst/>
+                <a:latin typeface="JetBrains Mono"/>
+              </a:rPr>
+              <a:t>, </a:t>
+            </a:r>
+            <a:r>
+              <a:rPr lang="en-US" dirty="0">
+                <a:solidFill>
+                  <a:srgbClr val="DD6718"/>
+                </a:solidFill>
+                <a:effectLst/>
+                <a:latin typeface="JetBrains Mono"/>
+              </a:rPr>
+              <a:t>format!</a:t>
+            </a:r>
+            <a:r>
+              <a:rPr lang="en-US" dirty="0">
+                <a:solidFill>
+                  <a:srgbClr val="080808"/>
+                </a:solidFill>
+                <a:effectLst/>
+                <a:latin typeface="JetBrains Mono"/>
+              </a:rPr>
+              <a:t>(</a:t>
+            </a:r>
+            <a:r>
+              <a:rPr lang="en-US" dirty="0">
+                <a:solidFill>
+                  <a:srgbClr val="067D17"/>
+                </a:solidFill>
+                <a:effectLst/>
+                <a:latin typeface="JetBrains Mono"/>
+              </a:rPr>
+              <a:t>"</a:t>
+            </a:r>
+            <a:r>
+              <a:rPr lang="en-US" dirty="0">
+                <a:solidFill>
+                  <a:srgbClr val="0037A6"/>
+                </a:solidFill>
+                <a:effectLst/>
+                <a:latin typeface="JetBrains Mono"/>
+              </a:rPr>
+              <a:t>{}</a:t>
+            </a:r>
+            <a:r>
+              <a:rPr lang="en-US" dirty="0">
+                <a:solidFill>
+                  <a:srgbClr val="067D17"/>
+                </a:solidFill>
+                <a:effectLst/>
+                <a:latin typeface="JetBrains Mono"/>
+              </a:rPr>
+              <a:t>"</a:t>
+            </a:r>
+            <a:r>
+              <a:rPr lang="en-US" dirty="0">
+                <a:solidFill>
+                  <a:srgbClr val="080808"/>
+                </a:solidFill>
+                <a:effectLst/>
+                <a:latin typeface="JetBrains Mono"/>
+              </a:rPr>
+              <a:t>, </a:t>
+            </a:r>
+            <a:r>
+              <a:rPr lang="en-US" dirty="0">
+                <a:solidFill>
+                  <a:srgbClr val="000000"/>
+                </a:solidFill>
+                <a:effectLst/>
+                <a:latin typeface="JetBrains Mono"/>
+              </a:rPr>
+              <a:t>person</a:t>
+            </a:r>
+            <a:r>
+              <a:rPr lang="en-US" dirty="0">
+                <a:solidFill>
+                  <a:srgbClr val="080808"/>
+                </a:solidFill>
+                <a:effectLst/>
+                <a:latin typeface="JetBrains Mono"/>
+              </a:rPr>
+              <a:t>));</a:t>
+            </a:r>
+            <a:br>
+              <a:rPr lang="en-US" dirty="0">
+                <a:solidFill>
+                  <a:srgbClr val="080808"/>
+                </a:solidFill>
+                <a:effectLst/>
+                <a:latin typeface="JetBrains Mono"/>
+              </a:rPr>
+            </a:br>
+            <a:br>
+              <a:rPr lang="en-US" dirty="0">
+                <a:solidFill>
+                  <a:srgbClr val="080808"/>
+                </a:solidFill>
+                <a:effectLst/>
+                <a:latin typeface="JetBrains Mono"/>
+              </a:rPr>
+            </a:br>
+            <a:r>
+              <a:rPr lang="en-US" dirty="0">
+                <a:solidFill>
+                  <a:srgbClr val="080808"/>
+                </a:solidFill>
+                <a:effectLst/>
+                <a:latin typeface="JetBrains Mono"/>
+              </a:rPr>
+              <a:t>    </a:t>
+            </a:r>
+            <a:r>
+              <a:rPr lang="en-US" dirty="0">
+                <a:solidFill>
+                  <a:srgbClr val="0033B3"/>
+                </a:solidFill>
+                <a:effectLst/>
+                <a:latin typeface="JetBrains Mono"/>
+              </a:rPr>
+              <a:t>let </a:t>
+            </a:r>
+            <a:r>
+              <a:rPr lang="en-US" dirty="0">
+                <a:solidFill>
+                  <a:srgbClr val="000000"/>
+                </a:solidFill>
+                <a:effectLst/>
+                <a:latin typeface="JetBrains Mono"/>
+              </a:rPr>
+              <a:t>passport </a:t>
+            </a:r>
+            <a:r>
+              <a:rPr lang="en-US" dirty="0">
+                <a:solidFill>
+                  <a:srgbClr val="080808"/>
+                </a:solidFill>
+                <a:effectLst/>
+                <a:latin typeface="JetBrains Mono"/>
+              </a:rPr>
+              <a:t>= </a:t>
+            </a:r>
+            <a:r>
+              <a:rPr lang="en-US" dirty="0" err="1">
+                <a:solidFill>
+                  <a:srgbClr val="080808"/>
+                </a:solidFill>
+                <a:effectLst/>
+                <a:latin typeface="JetBrains Mono"/>
+              </a:rPr>
+              <a:t>retrieve_passport</a:t>
+            </a:r>
+            <a:r>
+              <a:rPr lang="en-US" dirty="0">
+                <a:solidFill>
+                  <a:srgbClr val="080808"/>
+                </a:solidFill>
+                <a:effectLst/>
+                <a:latin typeface="JetBrains Mono"/>
+              </a:rPr>
+              <a:t>::&lt;</a:t>
+            </a:r>
+            <a:r>
+              <a:rPr lang="en-US" dirty="0">
+                <a:solidFill>
+                  <a:srgbClr val="000000"/>
+                </a:solidFill>
+                <a:effectLst/>
+                <a:latin typeface="JetBrains Mono"/>
+              </a:rPr>
+              <a:t>Person</a:t>
+            </a:r>
+            <a:r>
+              <a:rPr lang="en-US" dirty="0">
+                <a:solidFill>
+                  <a:srgbClr val="080808"/>
+                </a:solidFill>
+                <a:effectLst/>
+                <a:latin typeface="JetBrains Mono"/>
+              </a:rPr>
+              <a:t>&gt;(&amp;</a:t>
+            </a:r>
+            <a:r>
+              <a:rPr lang="en-US" dirty="0">
+                <a:solidFill>
+                  <a:srgbClr val="000000"/>
+                </a:solidFill>
+                <a:effectLst/>
+                <a:latin typeface="JetBrains Mono"/>
+              </a:rPr>
+              <a:t>person</a:t>
+            </a:r>
+            <a:r>
+              <a:rPr lang="en-US" dirty="0">
+                <a:solidFill>
+                  <a:srgbClr val="080808"/>
+                </a:solidFill>
+                <a:effectLst/>
+                <a:latin typeface="JetBrains Mono"/>
+              </a:rPr>
+              <a:t>); </a:t>
+            </a:r>
+            <a:r>
+              <a:rPr lang="en-US" i="1" dirty="0">
+                <a:solidFill>
+                  <a:srgbClr val="8C8C8C"/>
+                </a:solidFill>
+                <a:effectLst/>
+                <a:latin typeface="JetBrains Mono"/>
+              </a:rPr>
+              <a:t>// you MUST use </a:t>
+            </a:r>
+            <a:r>
+              <a:rPr lang="en-US" i="1" dirty="0" err="1">
+                <a:solidFill>
+                  <a:srgbClr val="8C8C8C"/>
+                </a:solidFill>
+                <a:effectLst/>
+                <a:latin typeface="JetBrains Mono"/>
+              </a:rPr>
+              <a:t>GetPassport</a:t>
+            </a:r>
+            <a:r>
+              <a:rPr lang="en-US" i="1" dirty="0">
+                <a:solidFill>
+                  <a:srgbClr val="8C8C8C"/>
+                </a:solidFill>
+                <a:effectLst/>
+                <a:latin typeface="JetBrains Mono"/>
+              </a:rPr>
+              <a:t> here</a:t>
+            </a:r>
+            <a:br>
+              <a:rPr lang="en-US" i="1" dirty="0">
+                <a:solidFill>
+                  <a:srgbClr val="8C8C8C"/>
+                </a:solidFill>
+                <a:effectLst/>
+                <a:latin typeface="JetBrains Mono"/>
+              </a:rPr>
+            </a:br>
+            <a:r>
+              <a:rPr lang="en-US" i="1" dirty="0">
+                <a:solidFill>
+                  <a:srgbClr val="8C8C8C"/>
+                </a:solidFill>
+                <a:effectLst/>
+                <a:latin typeface="JetBrains Mono"/>
+              </a:rPr>
+              <a:t>    </a:t>
+            </a:r>
+            <a:r>
+              <a:rPr lang="en-US" dirty="0" err="1">
+                <a:solidFill>
+                  <a:srgbClr val="DD6718"/>
+                </a:solidFill>
+                <a:effectLst/>
+                <a:latin typeface="JetBrains Mono"/>
+              </a:rPr>
+              <a:t>assert_eq</a:t>
+            </a:r>
+            <a:r>
+              <a:rPr lang="en-US" dirty="0">
+                <a:solidFill>
+                  <a:srgbClr val="DD6718"/>
+                </a:solidFill>
+                <a:effectLst/>
+                <a:latin typeface="JetBrains Mono"/>
+              </a:rPr>
+              <a:t>!</a:t>
+            </a:r>
+            <a:r>
+              <a:rPr lang="en-US" dirty="0">
+                <a:solidFill>
+                  <a:srgbClr val="080808"/>
+                </a:solidFill>
+                <a:effectLst/>
+                <a:latin typeface="JetBrains Mono"/>
+              </a:rPr>
+              <a:t>(</a:t>
+            </a:r>
+            <a:r>
+              <a:rPr lang="en-US" dirty="0">
+                <a:solidFill>
+                  <a:srgbClr val="1750EB"/>
+                </a:solidFill>
+                <a:effectLst/>
+                <a:latin typeface="JetBrains Mono"/>
+              </a:rPr>
+              <a:t>111</a:t>
+            </a:r>
+            <a:r>
+              <a:rPr lang="en-US" dirty="0">
+                <a:solidFill>
+                  <a:srgbClr val="080808"/>
+                </a:solidFill>
+                <a:effectLst/>
+                <a:latin typeface="JetBrains Mono"/>
+              </a:rPr>
+              <a:t>, </a:t>
+            </a:r>
+            <a:r>
+              <a:rPr lang="en-US" dirty="0">
+                <a:solidFill>
+                  <a:srgbClr val="000000"/>
+                </a:solidFill>
+                <a:effectLst/>
+                <a:latin typeface="JetBrains Mono"/>
+              </a:rPr>
+              <a:t>passport</a:t>
+            </a:r>
+            <a:r>
+              <a:rPr lang="en-US" dirty="0">
+                <a:solidFill>
+                  <a:srgbClr val="080808"/>
+                </a:solidFill>
+                <a:effectLst/>
+                <a:latin typeface="JetBrains Mono"/>
+              </a:rPr>
+              <a:t>.</a:t>
+            </a:r>
+            <a:r>
+              <a:rPr lang="en-US" dirty="0">
+                <a:solidFill>
+                  <a:srgbClr val="1750EB"/>
+                </a:solidFill>
+                <a:effectLst/>
+                <a:latin typeface="JetBrains Mono"/>
+              </a:rPr>
+              <a:t>0</a:t>
+            </a:r>
+            <a:r>
+              <a:rPr lang="en-US" dirty="0">
+                <a:solidFill>
+                  <a:srgbClr val="080808"/>
+                </a:solidFill>
+                <a:effectLst/>
+                <a:latin typeface="JetBrains Mono"/>
+              </a:rPr>
+              <a:t>);</a:t>
+            </a:r>
+            <a:br>
+              <a:rPr lang="en-US" dirty="0">
+                <a:solidFill>
+                  <a:srgbClr val="080808"/>
+                </a:solidFill>
+                <a:effectLst/>
+                <a:latin typeface="JetBrains Mono"/>
+              </a:rPr>
+            </a:br>
+            <a:br>
+              <a:rPr lang="en-US" dirty="0">
+                <a:solidFill>
+                  <a:srgbClr val="080808"/>
+                </a:solidFill>
+                <a:effectLst/>
+                <a:latin typeface="JetBrains Mono"/>
+              </a:rPr>
+            </a:br>
+            <a:r>
+              <a:rPr lang="en-US" dirty="0">
+                <a:solidFill>
+                  <a:srgbClr val="080808"/>
+                </a:solidFill>
+                <a:effectLst/>
+                <a:latin typeface="JetBrains Mono"/>
+              </a:rPr>
+              <a:t>    </a:t>
+            </a:r>
+            <a:r>
+              <a:rPr lang="en-US" dirty="0" err="1">
+                <a:solidFill>
+                  <a:srgbClr val="000000"/>
+                </a:solidFill>
+                <a:effectLst/>
+                <a:latin typeface="JetBrains Mono"/>
+              </a:rPr>
+              <a:t>person</a:t>
+            </a:r>
+            <a:r>
+              <a:rPr lang="en-US" dirty="0" err="1">
+                <a:solidFill>
+                  <a:srgbClr val="080808"/>
+                </a:solidFill>
+                <a:effectLst/>
+                <a:latin typeface="JetBrains Mono"/>
+              </a:rPr>
+              <a:t>.gdpr</a:t>
+            </a:r>
+            <a:r>
+              <a:rPr lang="en-US" dirty="0">
+                <a:solidFill>
+                  <a:srgbClr val="080808"/>
+                </a:solidFill>
+                <a:effectLst/>
+                <a:latin typeface="JetBrains Mono"/>
+              </a:rPr>
+              <a:t>(); </a:t>
+            </a:r>
+            <a:r>
+              <a:rPr lang="en-US" i="1" dirty="0">
+                <a:solidFill>
+                  <a:srgbClr val="8C8C8C"/>
+                </a:solidFill>
+                <a:effectLst/>
+                <a:latin typeface="JetBrains Mono"/>
+              </a:rPr>
+              <a:t>// GDPR regulations requires removing user data from memory</a:t>
+            </a:r>
+            <a:br>
+              <a:rPr lang="en-US" i="1" dirty="0">
+                <a:solidFill>
+                  <a:srgbClr val="8C8C8C"/>
+                </a:solidFill>
+                <a:effectLst/>
+                <a:latin typeface="JetBrains Mono"/>
+              </a:rPr>
+            </a:br>
+            <a:r>
+              <a:rPr lang="en-US" dirty="0">
+                <a:solidFill>
+                  <a:srgbClr val="080808"/>
+                </a:solidFill>
+                <a:effectLst/>
+                <a:latin typeface="JetBrains Mono"/>
+              </a:rPr>
+              <a:t>}</a:t>
+            </a:r>
+            <a:br>
+              <a:rPr lang="en-US" dirty="0">
+                <a:solidFill>
+                  <a:srgbClr val="080808"/>
+                </a:solidFill>
+                <a:effectLst/>
+                <a:latin typeface="JetBrains Mono"/>
+              </a:rPr>
+            </a:br>
+            <a:br>
+              <a:rPr lang="en-US" dirty="0">
+                <a:solidFill>
+                  <a:srgbClr val="080808"/>
+                </a:solidFill>
+                <a:effectLst/>
+                <a:latin typeface="JetBrains Mono"/>
+              </a:rPr>
+            </a:br>
+            <a:r>
+              <a:rPr lang="en-US" dirty="0">
+                <a:solidFill>
+                  <a:srgbClr val="0033B3"/>
+                </a:solidFill>
+                <a:effectLst/>
+                <a:latin typeface="JetBrains Mono"/>
+              </a:rPr>
+              <a:t>trait </a:t>
+            </a:r>
+            <a:r>
+              <a:rPr lang="en-US" dirty="0" err="1">
+                <a:solidFill>
+                  <a:srgbClr val="000000"/>
+                </a:solidFill>
+                <a:effectLst/>
+                <a:latin typeface="JetBrains Mono"/>
+              </a:rPr>
+              <a:t>GetPassport</a:t>
+            </a:r>
+            <a:r>
+              <a:rPr lang="en-US" dirty="0">
+                <a:solidFill>
+                  <a:srgbClr val="000000"/>
+                </a:solidFill>
+                <a:effectLst/>
+                <a:latin typeface="JetBrains Mono"/>
+              </a:rPr>
+              <a:t> </a:t>
+            </a:r>
+            <a:r>
+              <a:rPr lang="en-US" dirty="0">
+                <a:solidFill>
+                  <a:srgbClr val="080808"/>
+                </a:solidFill>
+                <a:effectLst/>
+                <a:latin typeface="JetBrains Mono"/>
+              </a:rPr>
+              <a:t>{</a:t>
+            </a:r>
+            <a:br>
+              <a:rPr lang="en-US" dirty="0">
+                <a:solidFill>
+                  <a:srgbClr val="080808"/>
+                </a:solidFill>
+                <a:effectLst/>
+                <a:latin typeface="JetBrains Mono"/>
+              </a:rPr>
+            </a:br>
+            <a:r>
+              <a:rPr lang="en-US" dirty="0">
+                <a:solidFill>
+                  <a:srgbClr val="080808"/>
+                </a:solidFill>
+                <a:effectLst/>
+                <a:latin typeface="JetBrains Mono"/>
+              </a:rPr>
+              <a:t>    </a:t>
+            </a:r>
+            <a:r>
+              <a:rPr lang="en-US" dirty="0" err="1">
+                <a:solidFill>
+                  <a:srgbClr val="0033B3"/>
+                </a:solidFill>
+                <a:effectLst/>
+                <a:latin typeface="JetBrains Mono"/>
+              </a:rPr>
+              <a:t>fn</a:t>
+            </a:r>
+            <a:r>
+              <a:rPr lang="en-US" dirty="0">
+                <a:solidFill>
+                  <a:srgbClr val="0033B3"/>
+                </a:solidFill>
+                <a:effectLst/>
+                <a:latin typeface="JetBrains Mono"/>
+              </a:rPr>
+              <a:t> </a:t>
+            </a:r>
+            <a:r>
+              <a:rPr lang="en-US" dirty="0" err="1">
+                <a:solidFill>
+                  <a:srgbClr val="00627A"/>
+                </a:solidFill>
+                <a:effectLst/>
+                <a:latin typeface="JetBrains Mono"/>
+              </a:rPr>
+              <a:t>get_passport</a:t>
+            </a:r>
+            <a:r>
+              <a:rPr lang="en-US" dirty="0">
+                <a:solidFill>
+                  <a:srgbClr val="080808"/>
+                </a:solidFill>
+                <a:effectLst/>
+                <a:latin typeface="JetBrains Mono"/>
+              </a:rPr>
+              <a:t>(&amp;</a:t>
+            </a:r>
+            <a:r>
+              <a:rPr lang="en-US" dirty="0">
+                <a:solidFill>
+                  <a:srgbClr val="0033B3"/>
+                </a:solidFill>
+                <a:effectLst/>
+                <a:latin typeface="JetBrains Mono"/>
+              </a:rPr>
+              <a:t>self</a:t>
+            </a:r>
+            <a:r>
+              <a:rPr lang="en-US" dirty="0">
+                <a:solidFill>
+                  <a:srgbClr val="080808"/>
+                </a:solidFill>
+                <a:effectLst/>
+                <a:latin typeface="JetBrains Mono"/>
+              </a:rPr>
+              <a:t>) -&gt; </a:t>
+            </a:r>
+            <a:r>
+              <a:rPr lang="en-US" dirty="0" err="1">
+                <a:solidFill>
+                  <a:srgbClr val="000000"/>
+                </a:solidFill>
+                <a:effectLst/>
+                <a:latin typeface="JetBrains Mono"/>
+              </a:rPr>
+              <a:t>PassportNumber</a:t>
+            </a:r>
+            <a:r>
+              <a:rPr lang="en-US" dirty="0">
+                <a:solidFill>
+                  <a:srgbClr val="080808"/>
+                </a:solidFill>
+                <a:effectLst/>
+                <a:latin typeface="JetBrains Mono"/>
+              </a:rPr>
+              <a:t>;</a:t>
+            </a:r>
+            <a:br>
+              <a:rPr lang="en-US" dirty="0">
+                <a:solidFill>
+                  <a:srgbClr val="080808"/>
+                </a:solidFill>
+                <a:effectLst/>
+                <a:latin typeface="JetBrains Mono"/>
+              </a:rPr>
+            </a:br>
+            <a:r>
+              <a:rPr lang="en-US" dirty="0">
+                <a:solidFill>
+                  <a:srgbClr val="080808"/>
+                </a:solidFill>
+                <a:effectLst/>
+                <a:latin typeface="JetBrains Mono"/>
+              </a:rPr>
+              <a:t>}</a:t>
+            </a:r>
+          </a:p>
+          <a:p>
+            <a:pPr marL="0" indent="0">
+              <a:buNone/>
+            </a:pPr>
+            <a:endParaRPr lang="ru-RU" dirty="0"/>
           </a:p>
         </p:txBody>
       </p:sp>
@@ -36111,6 +37602,166 @@
     <p:extLst>
       <p:ext uri="{BB962C8B-B14F-4D97-AF65-F5344CB8AC3E}">
         <p14:creationId xmlns:p14="http://schemas.microsoft.com/office/powerpoint/2010/main" val="1237145490"/>
+      </p:ext>
+    </p:extLst>
+  </p:cSld>
+  <p:clrMapOvr>
+    <a:masterClrMapping/>
+  </p:clrMapOvr>
+</p:sld>
+</file>
+
+<file path=ppt/slides/slide48.xml><?xml version="1.0" encoding="utf-8"?>
+<p:sld xmlns:a="http://schemas.openxmlformats.org/drawingml/2006/main" xmlns:r="http://schemas.openxmlformats.org/officeDocument/2006/relationships" xmlns:p="http://schemas.openxmlformats.org/presentationml/2006/main">
+  <p:cSld>
+    <p:spTree>
+      <p:nvGrpSpPr>
+        <p:cNvPr id="1" name=""/>
+        <p:cNvGrpSpPr/>
+        <p:nvPr/>
+      </p:nvGrpSpPr>
+      <p:grpSpPr>
+        <a:xfrm>
+          <a:off x="0" y="0"/>
+          <a:ext cx="0" cy="0"/>
+          <a:chOff x="0" y="0"/>
+          <a:chExt cx="0" cy="0"/>
+        </a:xfrm>
+      </p:grpSpPr>
+      <p:sp>
+        <p:nvSpPr>
+          <p:cNvPr id="2" name="Title 1">
+            <a:extLst>
+              <a:ext uri="{FF2B5EF4-FFF2-40B4-BE49-F238E27FC236}">
+                <a16:creationId xmlns:a16="http://schemas.microsoft.com/office/drawing/2014/main" id="{601EDD6B-F06B-C074-A2A9-E71347D152C2}"/>
+              </a:ext>
+            </a:extLst>
+          </p:cNvPr>
+          <p:cNvSpPr>
+            <a:spLocks noGrp="1"/>
+          </p:cNvSpPr>
+          <p:nvPr>
+            <p:ph type="title"/>
+          </p:nvPr>
+        </p:nvSpPr>
+        <p:spPr/>
+        <p:txBody>
+          <a:bodyPr/>
+          <a:lstStyle/>
+          <a:p>
+            <a:r>
+              <a:rPr lang="en-US" dirty="0"/>
+              <a:t>Homework</a:t>
+            </a:r>
+            <a:endParaRPr lang="ru-RU" dirty="0"/>
+          </a:p>
+        </p:txBody>
+      </p:sp>
+      <p:sp>
+        <p:nvSpPr>
+          <p:cNvPr id="3" name="Content Placeholder 2">
+            <a:extLst>
+              <a:ext uri="{FF2B5EF4-FFF2-40B4-BE49-F238E27FC236}">
+                <a16:creationId xmlns:a16="http://schemas.microsoft.com/office/drawing/2014/main" id="{F3FE997A-892C-E509-B404-6DDC8DE1E021}"/>
+              </a:ext>
+            </a:extLst>
+          </p:cNvPr>
+          <p:cNvSpPr>
+            <a:spLocks noGrp="1"/>
+          </p:cNvSpPr>
+          <p:nvPr>
+            <p:ph idx="1"/>
+          </p:nvPr>
+        </p:nvSpPr>
+        <p:spPr/>
+        <p:txBody>
+          <a:bodyPr/>
+          <a:lstStyle/>
+          <a:p>
+            <a:r>
+              <a:rPr lang="en-US" dirty="0">
+                <a:hlinkClick r:id="rId2"/>
+              </a:rPr>
+              <a:t>https://classroom.github.com/a/plOShaam</a:t>
+            </a:r>
+            <a:endParaRPr lang="en-US" dirty="0"/>
+          </a:p>
+          <a:p>
+            <a:r>
+              <a:rPr lang="en-US" dirty="0"/>
+              <a:t>Rustlings:</a:t>
+            </a:r>
+          </a:p>
+          <a:p>
+            <a:pPr lvl="1"/>
+            <a:r>
+              <a:rPr lang="en-US" dirty="0">
+                <a:solidFill>
+                  <a:srgbClr val="24292F"/>
+                </a:solidFill>
+                <a:latin typeface="-apple-system"/>
+              </a:rPr>
+              <a:t>s</a:t>
+            </a:r>
+            <a:r>
+              <a:rPr lang="en-US" b="0" i="0" dirty="0">
+                <a:solidFill>
+                  <a:srgbClr val="24292F"/>
+                </a:solidFill>
+                <a:effectLst/>
+                <a:latin typeface="-apple-system"/>
+              </a:rPr>
+              <a:t>tructs</a:t>
+            </a:r>
+          </a:p>
+          <a:p>
+            <a:pPr lvl="1"/>
+            <a:r>
+              <a:rPr lang="en-US" dirty="0">
+                <a:solidFill>
+                  <a:srgbClr val="24292F"/>
+                </a:solidFill>
+                <a:latin typeface="-apple-system"/>
+              </a:rPr>
+              <a:t>g</a:t>
+            </a:r>
+            <a:r>
+              <a:rPr lang="en-US" b="0" i="0" dirty="0">
+                <a:solidFill>
+                  <a:srgbClr val="24292F"/>
+                </a:solidFill>
+                <a:effectLst/>
+                <a:latin typeface="-apple-system"/>
+              </a:rPr>
+              <a:t>enerics</a:t>
+            </a:r>
+            <a:endParaRPr lang="en-US" dirty="0">
+              <a:solidFill>
+                <a:srgbClr val="24292F"/>
+              </a:solidFill>
+              <a:latin typeface="-apple-system"/>
+            </a:endParaRPr>
+          </a:p>
+          <a:p>
+            <a:pPr lvl="1"/>
+            <a:r>
+              <a:rPr lang="en-US" b="0" i="0" dirty="0">
+                <a:solidFill>
+                  <a:srgbClr val="24292F"/>
+                </a:solidFill>
+                <a:effectLst/>
+                <a:latin typeface="-apple-system"/>
+              </a:rPr>
+              <a:t>traits</a:t>
+            </a:r>
+            <a:endParaRPr lang="ru-RU" dirty="0"/>
+          </a:p>
+        </p:txBody>
+      </p:sp>
+    </p:spTree>
+    <p:extLst>
+      <p:ext uri="{BB962C8B-B14F-4D97-AF65-F5344CB8AC3E}">
+        <p14:creationId xmlns:p14="http://schemas.microsoft.com/office/powerpoint/2010/main" val="1152584853"/>
       </p:ext>
     </p:extLst>
   </p:cSld>

</xml_diff>